<commit_message>
commit all bryn's last day
</commit_message>
<xml_diff>
--- a/doc_bryn/for_bryn.pptx
+++ b/doc_bryn/for_bryn.pptx
@@ -923,7 +923,11 @@
         <a:p>
           <a:r>
             <a:rPr lang="en-US" dirty="0" smtClean="0"/>
-            <a:t>Polymer Diagrams</a:t>
+            <a:t>Polymer </a:t>
+          </a:r>
+          <a:r>
+            <a:rPr lang="en-US" dirty="0" smtClean="0"/>
+            <a:t>Diagrams        (P-OSRA)</a:t>
           </a:r>
           <a:endParaRPr lang="en-US" dirty="0"/>
         </a:p>
@@ -1264,22 +1268,22 @@
     </dgm:pt>
   </dgm:ptLst>
   <dgm:cxnLst>
+    <dgm:cxn modelId="{26A0FAF8-F975-4B3E-94D3-E013E2D8C5C4}" type="presOf" srcId="{6A1B1460-F09F-4139-AD5E-C1572A054A64}" destId="{6DB01D34-2DA1-4117-8B62-077AC91632B1}" srcOrd="0" destOrd="0" presId="urn:microsoft.com/office/officeart/2005/8/layout/orgChart1"/>
+    <dgm:cxn modelId="{A663EBC0-090F-4851-BF48-82E135230C1A}" type="presOf" srcId="{910E9CF2-AF8C-4E4F-A3AA-310F92B4DDDB}" destId="{40FB939B-7269-48FB-828A-2E3E7349C87A}" srcOrd="0" destOrd="0" presId="urn:microsoft.com/office/officeart/2005/8/layout/orgChart1"/>
+    <dgm:cxn modelId="{302E2A5A-A09E-4D88-ADA1-5217FEB33A61}" srcId="{CF1A8001-4FAB-42B9-8AF0-C3D4ED93A59A}" destId="{DDE15DBD-7AEB-4377-865C-4B51588AA3B7}" srcOrd="0" destOrd="0" parTransId="{910E9CF2-AF8C-4E4F-A3AA-310F92B4DDDB}" sibTransId="{49C60893-D6B6-488C-A84C-880A32B9A978}"/>
+    <dgm:cxn modelId="{D610925D-B50A-4A8D-BEC5-D178D9568EF8}" type="presOf" srcId="{5CEF62F2-2B81-46E5-9A04-0D714A6D5959}" destId="{97E2506B-5965-4D35-9B69-ADA8B8038363}" srcOrd="0" destOrd="0" presId="urn:microsoft.com/office/officeart/2005/8/layout/orgChart1"/>
+    <dgm:cxn modelId="{C4267B85-C08D-4C80-9CBD-59D03127BA61}" srcId="{CF1A8001-4FAB-42B9-8AF0-C3D4ED93A59A}" destId="{70BF0585-014B-4C7E-AFCA-AE2D11E08F49}" srcOrd="2" destOrd="0" parTransId="{6A1B1460-F09F-4139-AD5E-C1572A054A64}" sibTransId="{A303253E-1FC2-4A7A-AC18-091DAB81819B}"/>
+    <dgm:cxn modelId="{5BB9BEB7-0D28-417A-8494-C06F531430F4}" type="presOf" srcId="{DDE15DBD-7AEB-4377-865C-4B51588AA3B7}" destId="{06794DCD-688B-4F4E-83CC-06DF7E2D501C}" srcOrd="0" destOrd="0" presId="urn:microsoft.com/office/officeart/2005/8/layout/orgChart1"/>
     <dgm:cxn modelId="{D87A6674-CAA7-4BFA-85E0-54CA3E14044F}" srcId="{CF1A8001-4FAB-42B9-8AF0-C3D4ED93A59A}" destId="{487A448C-19D6-4DDF-9E54-1E59380404FC}" srcOrd="1" destOrd="0" parTransId="{3B990A8F-A549-4687-A745-23763B37E0DF}" sibTransId="{880AD585-B9FF-4A9B-A9FC-55CE65A01C9A}"/>
-    <dgm:cxn modelId="{C4267B85-C08D-4C80-9CBD-59D03127BA61}" srcId="{CF1A8001-4FAB-42B9-8AF0-C3D4ED93A59A}" destId="{70BF0585-014B-4C7E-AFCA-AE2D11E08F49}" srcOrd="2" destOrd="0" parTransId="{6A1B1460-F09F-4139-AD5E-C1572A054A64}" sibTransId="{A303253E-1FC2-4A7A-AC18-091DAB81819B}"/>
+    <dgm:cxn modelId="{1DF35642-3EAA-4E65-AB31-7E0AEBF49A4F}" type="presOf" srcId="{CF1A8001-4FAB-42B9-8AF0-C3D4ED93A59A}" destId="{BD738377-3190-43A1-A0C9-7603B4C4596B}" srcOrd="0" destOrd="0" presId="urn:microsoft.com/office/officeart/2005/8/layout/orgChart1"/>
+    <dgm:cxn modelId="{66972751-7286-4998-9934-64D768FCA485}" type="presOf" srcId="{70BF0585-014B-4C7E-AFCA-AE2D11E08F49}" destId="{055FD5FC-0DB3-48D9-B1B6-D5306C072981}" srcOrd="1" destOrd="0" presId="urn:microsoft.com/office/officeart/2005/8/layout/orgChart1"/>
+    <dgm:cxn modelId="{647A641F-33A2-4037-AF4D-12D46799BD3E}" type="presOf" srcId="{70BF0585-014B-4C7E-AFCA-AE2D11E08F49}" destId="{5C63F629-30CB-459C-BCDB-4B507FA4288C}" srcOrd="0" destOrd="0" presId="urn:microsoft.com/office/officeart/2005/8/layout/orgChart1"/>
+    <dgm:cxn modelId="{E11FC066-6588-42AF-9F33-7E2D1DEA6501}" type="presOf" srcId="{3B990A8F-A549-4687-A745-23763B37E0DF}" destId="{6A5C6264-7AED-4308-9236-93D8AB1A9984}" srcOrd="0" destOrd="0" presId="urn:microsoft.com/office/officeart/2005/8/layout/orgChart1"/>
+    <dgm:cxn modelId="{E0BADD9B-70E9-40ED-B25B-C8F07100E0BC}" type="presOf" srcId="{487A448C-19D6-4DDF-9E54-1E59380404FC}" destId="{188BF234-045F-4D16-9102-2D6E56AA8FE5}" srcOrd="1" destOrd="0" presId="urn:microsoft.com/office/officeart/2005/8/layout/orgChart1"/>
+    <dgm:cxn modelId="{4F719D54-01FA-43DC-816B-010507DFD655}" type="presOf" srcId="{487A448C-19D6-4DDF-9E54-1E59380404FC}" destId="{B99680DB-4168-4A48-9D1D-864E1968335B}" srcOrd="0" destOrd="0" presId="urn:microsoft.com/office/officeart/2005/8/layout/orgChart1"/>
+    <dgm:cxn modelId="{888069CA-05E2-4C6F-95F5-15687A55E251}" srcId="{5CEF62F2-2B81-46E5-9A04-0D714A6D5959}" destId="{CF1A8001-4FAB-42B9-8AF0-C3D4ED93A59A}" srcOrd="0" destOrd="0" parTransId="{E9073EB6-2B20-49F9-8E14-1E4F5958E5E0}" sibTransId="{BCA6A442-2496-4D3E-A4D5-8172CEBAB8B4}"/>
     <dgm:cxn modelId="{47D336B2-294A-41B1-9B42-1A3D61578BA2}" type="presOf" srcId="{CF1A8001-4FAB-42B9-8AF0-C3D4ED93A59A}" destId="{06BCC1DB-E842-4A3E-8274-07F4646051C9}" srcOrd="1" destOrd="0" presId="urn:microsoft.com/office/officeart/2005/8/layout/orgChart1"/>
-    <dgm:cxn modelId="{D610925D-B50A-4A8D-BEC5-D178D9568EF8}" type="presOf" srcId="{5CEF62F2-2B81-46E5-9A04-0D714A6D5959}" destId="{97E2506B-5965-4D35-9B69-ADA8B8038363}" srcOrd="0" destOrd="0" presId="urn:microsoft.com/office/officeart/2005/8/layout/orgChart1"/>
-    <dgm:cxn modelId="{66972751-7286-4998-9934-64D768FCA485}" type="presOf" srcId="{70BF0585-014B-4C7E-AFCA-AE2D11E08F49}" destId="{055FD5FC-0DB3-48D9-B1B6-D5306C072981}" srcOrd="1" destOrd="0" presId="urn:microsoft.com/office/officeart/2005/8/layout/orgChart1"/>
     <dgm:cxn modelId="{AFC7D0E5-7265-46F3-9865-1F2CF39EB6DB}" type="presOf" srcId="{DDE15DBD-7AEB-4377-865C-4B51588AA3B7}" destId="{B0579DBE-F4B7-4B96-9B5B-A7B00842BF84}" srcOrd="1" destOrd="0" presId="urn:microsoft.com/office/officeart/2005/8/layout/orgChart1"/>
-    <dgm:cxn modelId="{4F719D54-01FA-43DC-816B-010507DFD655}" type="presOf" srcId="{487A448C-19D6-4DDF-9E54-1E59380404FC}" destId="{B99680DB-4168-4A48-9D1D-864E1968335B}" srcOrd="0" destOrd="0" presId="urn:microsoft.com/office/officeart/2005/8/layout/orgChart1"/>
-    <dgm:cxn modelId="{26A0FAF8-F975-4B3E-94D3-E013E2D8C5C4}" type="presOf" srcId="{6A1B1460-F09F-4139-AD5E-C1572A054A64}" destId="{6DB01D34-2DA1-4117-8B62-077AC91632B1}" srcOrd="0" destOrd="0" presId="urn:microsoft.com/office/officeart/2005/8/layout/orgChart1"/>
-    <dgm:cxn modelId="{5BB9BEB7-0D28-417A-8494-C06F531430F4}" type="presOf" srcId="{DDE15DBD-7AEB-4377-865C-4B51588AA3B7}" destId="{06794DCD-688B-4F4E-83CC-06DF7E2D501C}" srcOrd="0" destOrd="0" presId="urn:microsoft.com/office/officeart/2005/8/layout/orgChart1"/>
-    <dgm:cxn modelId="{A663EBC0-090F-4851-BF48-82E135230C1A}" type="presOf" srcId="{910E9CF2-AF8C-4E4F-A3AA-310F92B4DDDB}" destId="{40FB939B-7269-48FB-828A-2E3E7349C87A}" srcOrd="0" destOrd="0" presId="urn:microsoft.com/office/officeart/2005/8/layout/orgChart1"/>
-    <dgm:cxn modelId="{E11FC066-6588-42AF-9F33-7E2D1DEA6501}" type="presOf" srcId="{3B990A8F-A549-4687-A745-23763B37E0DF}" destId="{6A5C6264-7AED-4308-9236-93D8AB1A9984}" srcOrd="0" destOrd="0" presId="urn:microsoft.com/office/officeart/2005/8/layout/orgChart1"/>
-    <dgm:cxn modelId="{647A641F-33A2-4037-AF4D-12D46799BD3E}" type="presOf" srcId="{70BF0585-014B-4C7E-AFCA-AE2D11E08F49}" destId="{5C63F629-30CB-459C-BCDB-4B507FA4288C}" srcOrd="0" destOrd="0" presId="urn:microsoft.com/office/officeart/2005/8/layout/orgChart1"/>
-    <dgm:cxn modelId="{302E2A5A-A09E-4D88-ADA1-5217FEB33A61}" srcId="{CF1A8001-4FAB-42B9-8AF0-C3D4ED93A59A}" destId="{DDE15DBD-7AEB-4377-865C-4B51588AA3B7}" srcOrd="0" destOrd="0" parTransId="{910E9CF2-AF8C-4E4F-A3AA-310F92B4DDDB}" sibTransId="{49C60893-D6B6-488C-A84C-880A32B9A978}"/>
-    <dgm:cxn modelId="{E0BADD9B-70E9-40ED-B25B-C8F07100E0BC}" type="presOf" srcId="{487A448C-19D6-4DDF-9E54-1E59380404FC}" destId="{188BF234-045F-4D16-9102-2D6E56AA8FE5}" srcOrd="1" destOrd="0" presId="urn:microsoft.com/office/officeart/2005/8/layout/orgChart1"/>
-    <dgm:cxn modelId="{888069CA-05E2-4C6F-95F5-15687A55E251}" srcId="{5CEF62F2-2B81-46E5-9A04-0D714A6D5959}" destId="{CF1A8001-4FAB-42B9-8AF0-C3D4ED93A59A}" srcOrd="0" destOrd="0" parTransId="{E9073EB6-2B20-49F9-8E14-1E4F5958E5E0}" sibTransId="{BCA6A442-2496-4D3E-A4D5-8172CEBAB8B4}"/>
-    <dgm:cxn modelId="{1DF35642-3EAA-4E65-AB31-7E0AEBF49A4F}" type="presOf" srcId="{CF1A8001-4FAB-42B9-8AF0-C3D4ED93A59A}" destId="{BD738377-3190-43A1-A0C9-7603B4C4596B}" srcOrd="0" destOrd="0" presId="urn:microsoft.com/office/officeart/2005/8/layout/orgChart1"/>
     <dgm:cxn modelId="{57F3A76F-F36D-4C72-8B19-70AC2E15BE20}" type="presParOf" srcId="{97E2506B-5965-4D35-9B69-ADA8B8038363}" destId="{E725D8E2-8A04-420C-BB63-67CDE33C5FE2}" srcOrd="0" destOrd="0" presId="urn:microsoft.com/office/officeart/2005/8/layout/orgChart1"/>
     <dgm:cxn modelId="{17C4AECE-35DE-459C-A804-70E24AA23ADC}" type="presParOf" srcId="{E725D8E2-8A04-420C-BB63-67CDE33C5FE2}" destId="{062AE79D-423E-4AA3-861B-4F853915BE0A}" srcOrd="0" destOrd="0" presId="urn:microsoft.com/office/officeart/2005/8/layout/orgChart1"/>
     <dgm:cxn modelId="{A9BC8186-D2B6-4967-99AB-7A51EA3D6511}" type="presParOf" srcId="{062AE79D-423E-4AA3-861B-4F853915BE0A}" destId="{BD738377-3190-43A1-A0C9-7603B4C4596B}" srcOrd="0" destOrd="0" presId="urn:microsoft.com/office/officeart/2005/8/layout/orgChart1"/>
@@ -1320,507 +1324,10 @@
   <dgm:whole/>
   <dgm:extLst>
     <a:ext uri="http://schemas.microsoft.com/office/drawing/2008/diagram">
-      <dsp:dataModelExt xmlns:dsp="http://schemas.microsoft.com/office/drawing/2008/diagram" relId="rId6" minVer="http://schemas.openxmlformats.org/drawingml/2006/diagram"/>
+      <dsp:dataModelExt xmlns:dsp="http://schemas.microsoft.com/office/drawing/2008/diagram" xmlns="" relId="rId6" minVer="http://schemas.openxmlformats.org/drawingml/2006/diagram"/>
     </a:ext>
   </dgm:extLst>
 </dgm:dataModel>
-</file>
-
-<file path=ppt/diagrams/drawing1.xml><?xml version="1.0" encoding="utf-8"?>
-<dsp:drawing xmlns:dgm="http://schemas.openxmlformats.org/drawingml/2006/diagram" xmlns:dsp="http://schemas.microsoft.com/office/drawing/2008/diagram" xmlns:a="http://schemas.openxmlformats.org/drawingml/2006/main">
-  <dsp:spTree>
-    <dsp:nvGrpSpPr>
-      <dsp:cNvPr id="0" name=""/>
-      <dsp:cNvGrpSpPr/>
-    </dsp:nvGrpSpPr>
-    <dsp:grpSpPr/>
-    <dsp:sp modelId="{6DB01D34-2DA1-4117-8B62-077AC91632B1}">
-      <dsp:nvSpPr>
-        <dsp:cNvPr id="0" name=""/>
-        <dsp:cNvSpPr/>
-      </dsp:nvSpPr>
-      <dsp:spPr>
-        <a:xfrm>
-          <a:off x="3318782" y="866584"/>
-          <a:ext cx="2095609" cy="363700"/>
-        </a:xfrm>
-        <a:custGeom>
-          <a:avLst/>
-          <a:gdLst/>
-          <a:ahLst/>
-          <a:cxnLst/>
-          <a:rect l="0" t="0" r="0" b="0"/>
-          <a:pathLst>
-            <a:path>
-              <a:moveTo>
-                <a:pt x="0" y="0"/>
-              </a:moveTo>
-              <a:lnTo>
-                <a:pt x="0" y="181850"/>
-              </a:lnTo>
-              <a:lnTo>
-                <a:pt x="2095609" y="181850"/>
-              </a:lnTo>
-              <a:lnTo>
-                <a:pt x="2095609" y="363700"/>
-              </a:lnTo>
-            </a:path>
-          </a:pathLst>
-        </a:custGeom>
-        <a:noFill/>
-        <a:ln w="25400" cap="flat" cmpd="sng" algn="ctr">
-          <a:solidFill>
-            <a:schemeClr val="accent1">
-              <a:shade val="60000"/>
-              <a:hueOff val="0"/>
-              <a:satOff val="0"/>
-              <a:lumOff val="0"/>
-              <a:alphaOff val="0"/>
-            </a:schemeClr>
-          </a:solidFill>
-          <a:prstDash val="solid"/>
-        </a:ln>
-        <a:effectLst/>
-      </dsp:spPr>
-      <dsp:style>
-        <a:lnRef idx="2">
-          <a:scrgbClr r="0" g="0" b="0"/>
-        </a:lnRef>
-        <a:fillRef idx="0">
-          <a:scrgbClr r="0" g="0" b="0"/>
-        </a:fillRef>
-        <a:effectRef idx="0">
-          <a:scrgbClr r="0" g="0" b="0"/>
-        </a:effectRef>
-        <a:fontRef idx="minor"/>
-      </dsp:style>
-    </dsp:sp>
-    <dsp:sp modelId="{6A5C6264-7AED-4308-9236-93D8AB1A9984}">
-      <dsp:nvSpPr>
-        <dsp:cNvPr id="0" name=""/>
-        <dsp:cNvSpPr/>
-      </dsp:nvSpPr>
-      <dsp:spPr>
-        <a:xfrm>
-          <a:off x="3273062" y="866584"/>
-          <a:ext cx="91440" cy="363700"/>
-        </a:xfrm>
-        <a:custGeom>
-          <a:avLst/>
-          <a:gdLst/>
-          <a:ahLst/>
-          <a:cxnLst/>
-          <a:rect l="0" t="0" r="0" b="0"/>
-          <a:pathLst>
-            <a:path>
-              <a:moveTo>
-                <a:pt x="45720" y="0"/>
-              </a:moveTo>
-              <a:lnTo>
-                <a:pt x="45720" y="363700"/>
-              </a:lnTo>
-            </a:path>
-          </a:pathLst>
-        </a:custGeom>
-        <a:noFill/>
-        <a:ln w="25400" cap="flat" cmpd="sng" algn="ctr">
-          <a:solidFill>
-            <a:schemeClr val="accent1">
-              <a:shade val="60000"/>
-              <a:hueOff val="0"/>
-              <a:satOff val="0"/>
-              <a:lumOff val="0"/>
-              <a:alphaOff val="0"/>
-            </a:schemeClr>
-          </a:solidFill>
-          <a:prstDash val="solid"/>
-        </a:ln>
-        <a:effectLst/>
-      </dsp:spPr>
-      <dsp:style>
-        <a:lnRef idx="2">
-          <a:scrgbClr r="0" g="0" b="0"/>
-        </a:lnRef>
-        <a:fillRef idx="0">
-          <a:scrgbClr r="0" g="0" b="0"/>
-        </a:fillRef>
-        <a:effectRef idx="0">
-          <a:scrgbClr r="0" g="0" b="0"/>
-        </a:effectRef>
-        <a:fontRef idx="minor"/>
-      </dsp:style>
-    </dsp:sp>
-    <dsp:sp modelId="{40FB939B-7269-48FB-828A-2E3E7349C87A}">
-      <dsp:nvSpPr>
-        <dsp:cNvPr id="0" name=""/>
-        <dsp:cNvSpPr/>
-      </dsp:nvSpPr>
-      <dsp:spPr>
-        <a:xfrm>
-          <a:off x="1223173" y="866584"/>
-          <a:ext cx="2095609" cy="363700"/>
-        </a:xfrm>
-        <a:custGeom>
-          <a:avLst/>
-          <a:gdLst/>
-          <a:ahLst/>
-          <a:cxnLst/>
-          <a:rect l="0" t="0" r="0" b="0"/>
-          <a:pathLst>
-            <a:path>
-              <a:moveTo>
-                <a:pt x="2095609" y="0"/>
-              </a:moveTo>
-              <a:lnTo>
-                <a:pt x="2095609" y="181850"/>
-              </a:lnTo>
-              <a:lnTo>
-                <a:pt x="0" y="181850"/>
-              </a:lnTo>
-              <a:lnTo>
-                <a:pt x="0" y="363700"/>
-              </a:lnTo>
-            </a:path>
-          </a:pathLst>
-        </a:custGeom>
-        <a:noFill/>
-        <a:ln w="25400" cap="flat" cmpd="sng" algn="ctr">
-          <a:solidFill>
-            <a:schemeClr val="accent1">
-              <a:shade val="60000"/>
-              <a:hueOff val="0"/>
-              <a:satOff val="0"/>
-              <a:lumOff val="0"/>
-              <a:alphaOff val="0"/>
-            </a:schemeClr>
-          </a:solidFill>
-          <a:prstDash val="solid"/>
-        </a:ln>
-        <a:effectLst/>
-      </dsp:spPr>
-      <dsp:style>
-        <a:lnRef idx="2">
-          <a:scrgbClr r="0" g="0" b="0"/>
-        </a:lnRef>
-        <a:fillRef idx="0">
-          <a:scrgbClr r="0" g="0" b="0"/>
-        </a:fillRef>
-        <a:effectRef idx="0">
-          <a:scrgbClr r="0" g="0" b="0"/>
-        </a:effectRef>
-        <a:fontRef idx="minor"/>
-      </dsp:style>
-    </dsp:sp>
-    <dsp:sp modelId="{BD738377-3190-43A1-A0C9-7603B4C4596B}">
-      <dsp:nvSpPr>
-        <dsp:cNvPr id="0" name=""/>
-        <dsp:cNvSpPr/>
-      </dsp:nvSpPr>
-      <dsp:spPr>
-        <a:xfrm>
-          <a:off x="2452828" y="629"/>
-          <a:ext cx="1731908" cy="865954"/>
-        </a:xfrm>
-        <a:prstGeom prst="rect">
-          <a:avLst/>
-        </a:prstGeom>
-        <a:solidFill>
-          <a:schemeClr val="accent1">
-            <a:hueOff val="0"/>
-            <a:satOff val="0"/>
-            <a:lumOff val="0"/>
-            <a:alphaOff val="0"/>
-          </a:schemeClr>
-        </a:solidFill>
-        <a:ln w="25400" cap="flat" cmpd="sng" algn="ctr">
-          <a:solidFill>
-            <a:schemeClr val="lt1">
-              <a:hueOff val="0"/>
-              <a:satOff val="0"/>
-              <a:lumOff val="0"/>
-              <a:alphaOff val="0"/>
-            </a:schemeClr>
-          </a:solidFill>
-          <a:prstDash val="solid"/>
-        </a:ln>
-        <a:effectLst/>
-      </dsp:spPr>
-      <dsp:style>
-        <a:lnRef idx="2">
-          <a:scrgbClr r="0" g="0" b="0"/>
-        </a:lnRef>
-        <a:fillRef idx="1">
-          <a:scrgbClr r="0" g="0" b="0"/>
-        </a:fillRef>
-        <a:effectRef idx="0">
-          <a:scrgbClr r="0" g="0" b="0"/>
-        </a:effectRef>
-        <a:fontRef idx="minor">
-          <a:schemeClr val="lt1"/>
-        </a:fontRef>
-      </dsp:style>
-      <dsp:txBody>
-        <a:bodyPr spcFirstLastPara="0" vert="horz" wrap="square" lIns="12700" tIns="12700" rIns="12700" bIns="12700" numCol="1" spcCol="1270" anchor="ctr" anchorCtr="0">
-          <a:noAutofit/>
-        </a:bodyPr>
-        <a:lstStyle/>
-        <a:p>
-          <a:pPr lvl="0" algn="ctr" defTabSz="889000">
-            <a:lnSpc>
-              <a:spcPct val="90000"/>
-            </a:lnSpc>
-            <a:spcBef>
-              <a:spcPct val="0"/>
-            </a:spcBef>
-            <a:spcAft>
-              <a:spcPct val="35000"/>
-            </a:spcAft>
-          </a:pPr>
-          <a:r>
-            <a:rPr lang="en-US" sz="2000" kern="1200" dirty="0" smtClean="0"/>
-            <a:t>Scientific Literature and Patents</a:t>
-          </a:r>
-          <a:endParaRPr lang="en-US" sz="2000" kern="1200" dirty="0"/>
-        </a:p>
-      </dsp:txBody>
-      <dsp:txXfrm>
-        <a:off x="2452828" y="629"/>
-        <a:ext cx="1731908" cy="865954"/>
-      </dsp:txXfrm>
-    </dsp:sp>
-    <dsp:sp modelId="{06794DCD-688B-4F4E-83CC-06DF7E2D501C}">
-      <dsp:nvSpPr>
-        <dsp:cNvPr id="0" name=""/>
-        <dsp:cNvSpPr/>
-      </dsp:nvSpPr>
-      <dsp:spPr>
-        <a:xfrm>
-          <a:off x="357218" y="1230284"/>
-          <a:ext cx="1731908" cy="865954"/>
-        </a:xfrm>
-        <a:prstGeom prst="rect">
-          <a:avLst/>
-        </a:prstGeom>
-        <a:solidFill>
-          <a:schemeClr val="accent1">
-            <a:hueOff val="0"/>
-            <a:satOff val="0"/>
-            <a:lumOff val="0"/>
-            <a:alphaOff val="0"/>
-          </a:schemeClr>
-        </a:solidFill>
-        <a:ln w="25400" cap="flat" cmpd="sng" algn="ctr">
-          <a:solidFill>
-            <a:schemeClr val="lt1">
-              <a:hueOff val="0"/>
-              <a:satOff val="0"/>
-              <a:lumOff val="0"/>
-              <a:alphaOff val="0"/>
-            </a:schemeClr>
-          </a:solidFill>
-          <a:prstDash val="solid"/>
-        </a:ln>
-        <a:effectLst/>
-      </dsp:spPr>
-      <dsp:style>
-        <a:lnRef idx="2">
-          <a:scrgbClr r="0" g="0" b="0"/>
-        </a:lnRef>
-        <a:fillRef idx="1">
-          <a:scrgbClr r="0" g="0" b="0"/>
-        </a:fillRef>
-        <a:effectRef idx="0">
-          <a:scrgbClr r="0" g="0" b="0"/>
-        </a:effectRef>
-        <a:fontRef idx="minor">
-          <a:schemeClr val="lt1"/>
-        </a:fontRef>
-      </dsp:style>
-      <dsp:txBody>
-        <a:bodyPr spcFirstLastPara="0" vert="horz" wrap="square" lIns="12700" tIns="12700" rIns="12700" bIns="12700" numCol="1" spcCol="1270" anchor="ctr" anchorCtr="0">
-          <a:noAutofit/>
-        </a:bodyPr>
-        <a:lstStyle/>
-        <a:p>
-          <a:pPr lvl="0" algn="ctr" defTabSz="889000">
-            <a:lnSpc>
-              <a:spcPct val="90000"/>
-            </a:lnSpc>
-            <a:spcBef>
-              <a:spcPct val="0"/>
-            </a:spcBef>
-            <a:spcAft>
-              <a:spcPct val="35000"/>
-            </a:spcAft>
-          </a:pPr>
-          <a:r>
-            <a:rPr lang="en-US" sz="2000" kern="1200" dirty="0" smtClean="0"/>
-            <a:t>Polymer Diagrams</a:t>
-          </a:r>
-          <a:endParaRPr lang="en-US" sz="2000" kern="1200" dirty="0"/>
-        </a:p>
-      </dsp:txBody>
-      <dsp:txXfrm>
-        <a:off x="357218" y="1230284"/>
-        <a:ext cx="1731908" cy="865954"/>
-      </dsp:txXfrm>
-    </dsp:sp>
-    <dsp:sp modelId="{B99680DB-4168-4A48-9D1D-864E1968335B}">
-      <dsp:nvSpPr>
-        <dsp:cNvPr id="0" name=""/>
-        <dsp:cNvSpPr/>
-      </dsp:nvSpPr>
-      <dsp:spPr>
-        <a:xfrm>
-          <a:off x="2452828" y="1230284"/>
-          <a:ext cx="1731908" cy="865954"/>
-        </a:xfrm>
-        <a:prstGeom prst="rect">
-          <a:avLst/>
-        </a:prstGeom>
-        <a:solidFill>
-          <a:schemeClr val="accent1">
-            <a:hueOff val="0"/>
-            <a:satOff val="0"/>
-            <a:lumOff val="0"/>
-            <a:alphaOff val="0"/>
-          </a:schemeClr>
-        </a:solidFill>
-        <a:ln w="25400" cap="flat" cmpd="sng" algn="ctr">
-          <a:solidFill>
-            <a:schemeClr val="lt1">
-              <a:hueOff val="0"/>
-              <a:satOff val="0"/>
-              <a:lumOff val="0"/>
-              <a:alphaOff val="0"/>
-            </a:schemeClr>
-          </a:solidFill>
-          <a:prstDash val="solid"/>
-        </a:ln>
-        <a:effectLst/>
-      </dsp:spPr>
-      <dsp:style>
-        <a:lnRef idx="2">
-          <a:scrgbClr r="0" g="0" b="0"/>
-        </a:lnRef>
-        <a:fillRef idx="1">
-          <a:scrgbClr r="0" g="0" b="0"/>
-        </a:fillRef>
-        <a:effectRef idx="0">
-          <a:scrgbClr r="0" g="0" b="0"/>
-        </a:effectRef>
-        <a:fontRef idx="minor">
-          <a:schemeClr val="lt1"/>
-        </a:fontRef>
-      </dsp:style>
-      <dsp:txBody>
-        <a:bodyPr spcFirstLastPara="0" vert="horz" wrap="square" lIns="12700" tIns="12700" rIns="12700" bIns="12700" numCol="1" spcCol="1270" anchor="ctr" anchorCtr="0">
-          <a:noAutofit/>
-        </a:bodyPr>
-        <a:lstStyle/>
-        <a:p>
-          <a:pPr lvl="0" algn="ctr" defTabSz="889000">
-            <a:lnSpc>
-              <a:spcPct val="90000"/>
-            </a:lnSpc>
-            <a:spcBef>
-              <a:spcPct val="0"/>
-            </a:spcBef>
-            <a:spcAft>
-              <a:spcPct val="35000"/>
-            </a:spcAft>
-          </a:pPr>
-          <a:r>
-            <a:rPr lang="en-US" sz="2000" kern="1200" dirty="0" smtClean="0"/>
-            <a:t>Polymer Names</a:t>
-          </a:r>
-          <a:endParaRPr lang="en-US" sz="2000" kern="1200" dirty="0"/>
-        </a:p>
-      </dsp:txBody>
-      <dsp:txXfrm>
-        <a:off x="2452828" y="1230284"/>
-        <a:ext cx="1731908" cy="865954"/>
-      </dsp:txXfrm>
-    </dsp:sp>
-    <dsp:sp modelId="{5C63F629-30CB-459C-BCDB-4B507FA4288C}">
-      <dsp:nvSpPr>
-        <dsp:cNvPr id="0" name=""/>
-        <dsp:cNvSpPr/>
-      </dsp:nvSpPr>
-      <dsp:spPr>
-        <a:xfrm>
-          <a:off x="4548437" y="1230284"/>
-          <a:ext cx="1731908" cy="865954"/>
-        </a:xfrm>
-        <a:prstGeom prst="rect">
-          <a:avLst/>
-        </a:prstGeom>
-        <a:solidFill>
-          <a:schemeClr val="accent1">
-            <a:hueOff val="0"/>
-            <a:satOff val="0"/>
-            <a:lumOff val="0"/>
-            <a:alphaOff val="0"/>
-          </a:schemeClr>
-        </a:solidFill>
-        <a:ln w="25400" cap="flat" cmpd="sng" algn="ctr">
-          <a:solidFill>
-            <a:schemeClr val="lt1">
-              <a:hueOff val="0"/>
-              <a:satOff val="0"/>
-              <a:lumOff val="0"/>
-              <a:alphaOff val="0"/>
-            </a:schemeClr>
-          </a:solidFill>
-          <a:prstDash val="solid"/>
-        </a:ln>
-        <a:effectLst/>
-      </dsp:spPr>
-      <dsp:style>
-        <a:lnRef idx="2">
-          <a:scrgbClr r="0" g="0" b="0"/>
-        </a:lnRef>
-        <a:fillRef idx="1">
-          <a:scrgbClr r="0" g="0" b="0"/>
-        </a:fillRef>
-        <a:effectRef idx="0">
-          <a:scrgbClr r="0" g="0" b="0"/>
-        </a:effectRef>
-        <a:fontRef idx="minor">
-          <a:schemeClr val="lt1"/>
-        </a:fontRef>
-      </dsp:style>
-      <dsp:txBody>
-        <a:bodyPr spcFirstLastPara="0" vert="horz" wrap="square" lIns="12700" tIns="12700" rIns="12700" bIns="12700" numCol="1" spcCol="1270" anchor="ctr" anchorCtr="0">
-          <a:noAutofit/>
-        </a:bodyPr>
-        <a:lstStyle/>
-        <a:p>
-          <a:pPr lvl="0" algn="ctr" defTabSz="889000">
-            <a:lnSpc>
-              <a:spcPct val="90000"/>
-            </a:lnSpc>
-            <a:spcBef>
-              <a:spcPct val="0"/>
-            </a:spcBef>
-            <a:spcAft>
-              <a:spcPct val="35000"/>
-            </a:spcAft>
-          </a:pPr>
-          <a:r>
-            <a:rPr lang="en-US" sz="2000" kern="1200" dirty="0" smtClean="0"/>
-            <a:t>Tables and other textual info</a:t>
-          </a:r>
-          <a:endParaRPr lang="en-US" sz="2000" kern="1200" dirty="0"/>
-        </a:p>
-      </dsp:txBody>
-      <dsp:txXfrm>
-        <a:off x="4548437" y="1230284"/>
-        <a:ext cx="1731908" cy="865954"/>
-      </dsp:txXfrm>
-    </dsp:sp>
-  </dsp:spTree>
-</dsp:drawing>
 </file>
 
 <file path=ppt/diagrams/layout1.xml><?xml version="1.0" encoding="utf-8"?>
@@ -4085,7 +3592,8 @@
           <a:p>
             <a:fld id="{49803D35-F237-45FB-8E06-7792A0B37429}" type="datetimeFigureOut">
               <a:rPr lang="en-US" smtClean="0"/>
-              <a:t>7/1/2014</a:t>
+              <a:pPr/>
+              <a:t>7/28/2014</a:t>
             </a:fld>
             <a:endParaRPr lang="en-US"/>
           </a:p>
@@ -4244,6 +3752,7 @@
           <a:p>
             <a:fld id="{0CE09A4A-A0D1-454E-BBF5-18582FEA871A}" type="slidenum">
               <a:rPr lang="en-US" smtClean="0"/>
+              <a:pPr/>
               <a:t>‹#›</a:t>
             </a:fld>
             <a:endParaRPr lang="en-US"/>
@@ -4253,7 +3762,7 @@
     </p:spTree>
     <p:extLst>
       <p:ext uri="{BB962C8B-B14F-4D97-AF65-F5344CB8AC3E}">
-        <p14:creationId xmlns:p14="http://schemas.microsoft.com/office/powerpoint/2010/main" val="64901590"/>
+        <p14:creationId xmlns:p14="http://schemas.microsoft.com/office/powerpoint/2010/main" xmlns="" val="64901590"/>
       </p:ext>
     </p:extLst>
   </p:cSld>
@@ -4422,6 +3931,7 @@
           <a:p>
             <a:fld id="{0CE09A4A-A0D1-454E-BBF5-18582FEA871A}" type="slidenum">
               <a:rPr lang="en-US" smtClean="0"/>
+              <a:pPr/>
               <a:t>4</a:t>
             </a:fld>
             <a:endParaRPr lang="en-US"/>
@@ -4431,7 +3941,7 @@
     </p:spTree>
     <p:extLst>
       <p:ext uri="{BB962C8B-B14F-4D97-AF65-F5344CB8AC3E}">
-        <p14:creationId xmlns:p14="http://schemas.microsoft.com/office/powerpoint/2010/main" val="605514436"/>
+        <p14:creationId xmlns:p14="http://schemas.microsoft.com/office/powerpoint/2010/main" xmlns="" val="605514436"/>
       </p:ext>
     </p:extLst>
   </p:cSld>
@@ -4520,6 +4030,7 @@
           <a:p>
             <a:fld id="{0CE09A4A-A0D1-454E-BBF5-18582FEA871A}" type="slidenum">
               <a:rPr lang="en-US" smtClean="0"/>
+              <a:pPr/>
               <a:t>5</a:t>
             </a:fld>
             <a:endParaRPr lang="en-US"/>
@@ -4529,7 +4040,7 @@
     </p:spTree>
     <p:extLst>
       <p:ext uri="{BB962C8B-B14F-4D97-AF65-F5344CB8AC3E}">
-        <p14:creationId xmlns:p14="http://schemas.microsoft.com/office/powerpoint/2010/main" val="757292172"/>
+        <p14:creationId xmlns:p14="http://schemas.microsoft.com/office/powerpoint/2010/main" xmlns="" val="757292172"/>
       </p:ext>
     </p:extLst>
   </p:cSld>
@@ -4618,6 +4129,7 @@
           <a:p>
             <a:fld id="{0CE09A4A-A0D1-454E-BBF5-18582FEA871A}" type="slidenum">
               <a:rPr lang="en-US" smtClean="0"/>
+              <a:pPr/>
               <a:t>6</a:t>
             </a:fld>
             <a:endParaRPr lang="en-US"/>
@@ -4627,7 +4139,7 @@
     </p:spTree>
     <p:extLst>
       <p:ext uri="{BB962C8B-B14F-4D97-AF65-F5344CB8AC3E}">
-        <p14:creationId xmlns:p14="http://schemas.microsoft.com/office/powerpoint/2010/main" val="757292172"/>
+        <p14:creationId xmlns:p14="http://schemas.microsoft.com/office/powerpoint/2010/main" xmlns="" val="757292172"/>
       </p:ext>
     </p:extLst>
   </p:cSld>
@@ -4716,6 +4228,7 @@
           <a:p>
             <a:fld id="{0CE09A4A-A0D1-454E-BBF5-18582FEA871A}" type="slidenum">
               <a:rPr lang="en-US" smtClean="0"/>
+              <a:pPr/>
               <a:t>7</a:t>
             </a:fld>
             <a:endParaRPr lang="en-US"/>
@@ -4725,7 +4238,7 @@
     </p:spTree>
     <p:extLst>
       <p:ext uri="{BB962C8B-B14F-4D97-AF65-F5344CB8AC3E}">
-        <p14:creationId xmlns:p14="http://schemas.microsoft.com/office/powerpoint/2010/main" val="757292172"/>
+        <p14:creationId xmlns:p14="http://schemas.microsoft.com/office/powerpoint/2010/main" xmlns="" val="757292172"/>
       </p:ext>
     </p:extLst>
   </p:cSld>
@@ -4916,7 +4429,8 @@
           <a:p>
             <a:fld id="{2C1AB886-C58C-E04A-A1A5-89119FBFA308}" type="datetimeFigureOut">
               <a:rPr lang="en-US" smtClean="0"/>
-              <a:t>7/1/2014</a:t>
+              <a:pPr/>
+              <a:t>7/28/2014</a:t>
             </a:fld>
             <a:endParaRPr lang="en-US"/>
           </a:p>
@@ -4958,6 +4472,7 @@
           <a:p>
             <a:fld id="{E63D5F4D-67BA-2043-B4FA-2B1A402302C1}" type="slidenum">
               <a:rPr lang="en-US" smtClean="0"/>
+              <a:pPr/>
               <a:t>‹#›</a:t>
             </a:fld>
             <a:endParaRPr lang="en-US"/>
@@ -4967,7 +4482,7 @@
     </p:spTree>
     <p:extLst>
       <p:ext uri="{BB962C8B-B14F-4D97-AF65-F5344CB8AC3E}">
-        <p14:creationId xmlns:p14="http://schemas.microsoft.com/office/powerpoint/2010/main" val="1781412510"/>
+        <p14:creationId xmlns:p14="http://schemas.microsoft.com/office/powerpoint/2010/main" xmlns="" val="1781412510"/>
       </p:ext>
     </p:extLst>
   </p:cSld>
@@ -5086,7 +4601,8 @@
           <a:p>
             <a:fld id="{2C1AB886-C58C-E04A-A1A5-89119FBFA308}" type="datetimeFigureOut">
               <a:rPr lang="en-US" smtClean="0"/>
-              <a:t>7/1/2014</a:t>
+              <a:pPr/>
+              <a:t>7/28/2014</a:t>
             </a:fld>
             <a:endParaRPr lang="en-US"/>
           </a:p>
@@ -5128,6 +4644,7 @@
           <a:p>
             <a:fld id="{E63D5F4D-67BA-2043-B4FA-2B1A402302C1}" type="slidenum">
               <a:rPr lang="en-US" smtClean="0"/>
+              <a:pPr/>
               <a:t>‹#›</a:t>
             </a:fld>
             <a:endParaRPr lang="en-US"/>
@@ -5137,7 +4654,7 @@
     </p:spTree>
     <p:extLst>
       <p:ext uri="{BB962C8B-B14F-4D97-AF65-F5344CB8AC3E}">
-        <p14:creationId xmlns:p14="http://schemas.microsoft.com/office/powerpoint/2010/main" val="2911160093"/>
+        <p14:creationId xmlns:p14="http://schemas.microsoft.com/office/powerpoint/2010/main" xmlns="" val="2911160093"/>
       </p:ext>
     </p:extLst>
   </p:cSld>
@@ -5266,7 +4783,8 @@
           <a:p>
             <a:fld id="{2C1AB886-C58C-E04A-A1A5-89119FBFA308}" type="datetimeFigureOut">
               <a:rPr lang="en-US" smtClean="0"/>
-              <a:t>7/1/2014</a:t>
+              <a:pPr/>
+              <a:t>7/28/2014</a:t>
             </a:fld>
             <a:endParaRPr lang="en-US"/>
           </a:p>
@@ -5308,6 +4826,7 @@
           <a:p>
             <a:fld id="{E63D5F4D-67BA-2043-B4FA-2B1A402302C1}" type="slidenum">
               <a:rPr lang="en-US" smtClean="0"/>
+              <a:pPr/>
               <a:t>‹#›</a:t>
             </a:fld>
             <a:endParaRPr lang="en-US"/>
@@ -5317,7 +4836,7 @@
     </p:spTree>
     <p:extLst>
       <p:ext uri="{BB962C8B-B14F-4D97-AF65-F5344CB8AC3E}">
-        <p14:creationId xmlns:p14="http://schemas.microsoft.com/office/powerpoint/2010/main" val="2560946050"/>
+        <p14:creationId xmlns:p14="http://schemas.microsoft.com/office/powerpoint/2010/main" xmlns="" val="2560946050"/>
       </p:ext>
     </p:extLst>
   </p:cSld>
@@ -5436,7 +4955,8 @@
           <a:p>
             <a:fld id="{2C1AB886-C58C-E04A-A1A5-89119FBFA308}" type="datetimeFigureOut">
               <a:rPr lang="en-US" smtClean="0"/>
-              <a:t>7/1/2014</a:t>
+              <a:pPr/>
+              <a:t>7/28/2014</a:t>
             </a:fld>
             <a:endParaRPr lang="en-US"/>
           </a:p>
@@ -5478,6 +4998,7 @@
           <a:p>
             <a:fld id="{E63D5F4D-67BA-2043-B4FA-2B1A402302C1}" type="slidenum">
               <a:rPr lang="en-US" smtClean="0"/>
+              <a:pPr/>
               <a:t>‹#›</a:t>
             </a:fld>
             <a:endParaRPr lang="en-US"/>
@@ -5487,7 +5008,7 @@
     </p:spTree>
     <p:extLst>
       <p:ext uri="{BB962C8B-B14F-4D97-AF65-F5344CB8AC3E}">
-        <p14:creationId xmlns:p14="http://schemas.microsoft.com/office/powerpoint/2010/main" val="1768715842"/>
+        <p14:creationId xmlns:p14="http://schemas.microsoft.com/office/powerpoint/2010/main" xmlns="" val="1768715842"/>
       </p:ext>
     </p:extLst>
   </p:cSld>
@@ -5682,7 +5203,8 @@
           <a:p>
             <a:fld id="{2C1AB886-C58C-E04A-A1A5-89119FBFA308}" type="datetimeFigureOut">
               <a:rPr lang="en-US" smtClean="0"/>
-              <a:t>7/1/2014</a:t>
+              <a:pPr/>
+              <a:t>7/28/2014</a:t>
             </a:fld>
             <a:endParaRPr lang="en-US"/>
           </a:p>
@@ -5724,6 +5246,7 @@
           <a:p>
             <a:fld id="{E63D5F4D-67BA-2043-B4FA-2B1A402302C1}" type="slidenum">
               <a:rPr lang="en-US" smtClean="0"/>
+              <a:pPr/>
               <a:t>‹#›</a:t>
             </a:fld>
             <a:endParaRPr lang="en-US"/>
@@ -5733,7 +5256,7 @@
     </p:spTree>
     <p:extLst>
       <p:ext uri="{BB962C8B-B14F-4D97-AF65-F5344CB8AC3E}">
-        <p14:creationId xmlns:p14="http://schemas.microsoft.com/office/powerpoint/2010/main" val="2554560047"/>
+        <p14:creationId xmlns:p14="http://schemas.microsoft.com/office/powerpoint/2010/main" xmlns="" val="2554560047"/>
       </p:ext>
     </p:extLst>
   </p:cSld>
@@ -5970,7 +5493,8 @@
           <a:p>
             <a:fld id="{2C1AB886-C58C-E04A-A1A5-89119FBFA308}" type="datetimeFigureOut">
               <a:rPr lang="en-US" smtClean="0"/>
-              <a:t>7/1/2014</a:t>
+              <a:pPr/>
+              <a:t>7/28/2014</a:t>
             </a:fld>
             <a:endParaRPr lang="en-US"/>
           </a:p>
@@ -6012,6 +5536,7 @@
           <a:p>
             <a:fld id="{E63D5F4D-67BA-2043-B4FA-2B1A402302C1}" type="slidenum">
               <a:rPr lang="en-US" smtClean="0"/>
+              <a:pPr/>
               <a:t>‹#›</a:t>
             </a:fld>
             <a:endParaRPr lang="en-US"/>
@@ -6021,7 +5546,7 @@
     </p:spTree>
     <p:extLst>
       <p:ext uri="{BB962C8B-B14F-4D97-AF65-F5344CB8AC3E}">
-        <p14:creationId xmlns:p14="http://schemas.microsoft.com/office/powerpoint/2010/main" val="3544275008"/>
+        <p14:creationId xmlns:p14="http://schemas.microsoft.com/office/powerpoint/2010/main" xmlns="" val="3544275008"/>
       </p:ext>
     </p:extLst>
   </p:cSld>
@@ -6392,7 +5917,8 @@
           <a:p>
             <a:fld id="{2C1AB886-C58C-E04A-A1A5-89119FBFA308}" type="datetimeFigureOut">
               <a:rPr lang="en-US" smtClean="0"/>
-              <a:t>7/1/2014</a:t>
+              <a:pPr/>
+              <a:t>7/28/2014</a:t>
             </a:fld>
             <a:endParaRPr lang="en-US"/>
           </a:p>
@@ -6434,6 +5960,7 @@
           <a:p>
             <a:fld id="{E63D5F4D-67BA-2043-B4FA-2B1A402302C1}" type="slidenum">
               <a:rPr lang="en-US" smtClean="0"/>
+              <a:pPr/>
               <a:t>‹#›</a:t>
             </a:fld>
             <a:endParaRPr lang="en-US"/>
@@ -6443,7 +5970,7 @@
     </p:spTree>
     <p:extLst>
       <p:ext uri="{BB962C8B-B14F-4D97-AF65-F5344CB8AC3E}">
-        <p14:creationId xmlns:p14="http://schemas.microsoft.com/office/powerpoint/2010/main" val="3278539941"/>
+        <p14:creationId xmlns:p14="http://schemas.microsoft.com/office/powerpoint/2010/main" xmlns="" val="3278539941"/>
       </p:ext>
     </p:extLst>
   </p:cSld>
@@ -6510,7 +6037,8 @@
           <a:p>
             <a:fld id="{2C1AB886-C58C-E04A-A1A5-89119FBFA308}" type="datetimeFigureOut">
               <a:rPr lang="en-US" smtClean="0"/>
-              <a:t>7/1/2014</a:t>
+              <a:pPr/>
+              <a:t>7/28/2014</a:t>
             </a:fld>
             <a:endParaRPr lang="en-US"/>
           </a:p>
@@ -6552,6 +6080,7 @@
           <a:p>
             <a:fld id="{E63D5F4D-67BA-2043-B4FA-2B1A402302C1}" type="slidenum">
               <a:rPr lang="en-US" smtClean="0"/>
+              <a:pPr/>
               <a:t>‹#›</a:t>
             </a:fld>
             <a:endParaRPr lang="en-US"/>
@@ -6561,7 +6090,7 @@
     </p:spTree>
     <p:extLst>
       <p:ext uri="{BB962C8B-B14F-4D97-AF65-F5344CB8AC3E}">
-        <p14:creationId xmlns:p14="http://schemas.microsoft.com/office/powerpoint/2010/main" val="586848663"/>
+        <p14:creationId xmlns:p14="http://schemas.microsoft.com/office/powerpoint/2010/main" xmlns="" val="586848663"/>
       </p:ext>
     </p:extLst>
   </p:cSld>
@@ -6605,7 +6134,8 @@
           <a:p>
             <a:fld id="{2C1AB886-C58C-E04A-A1A5-89119FBFA308}" type="datetimeFigureOut">
               <a:rPr lang="en-US" smtClean="0"/>
-              <a:t>7/1/2014</a:t>
+              <a:pPr/>
+              <a:t>7/28/2014</a:t>
             </a:fld>
             <a:endParaRPr lang="en-US"/>
           </a:p>
@@ -6647,6 +6177,7 @@
           <a:p>
             <a:fld id="{E63D5F4D-67BA-2043-B4FA-2B1A402302C1}" type="slidenum">
               <a:rPr lang="en-US" smtClean="0"/>
+              <a:pPr/>
               <a:t>‹#›</a:t>
             </a:fld>
             <a:endParaRPr lang="en-US"/>
@@ -6656,7 +6187,7 @@
     </p:spTree>
     <p:extLst>
       <p:ext uri="{BB962C8B-B14F-4D97-AF65-F5344CB8AC3E}">
-        <p14:creationId xmlns:p14="http://schemas.microsoft.com/office/powerpoint/2010/main" val="983803784"/>
+        <p14:creationId xmlns:p14="http://schemas.microsoft.com/office/powerpoint/2010/main" xmlns="" val="983803784"/>
       </p:ext>
     </p:extLst>
   </p:cSld>
@@ -6882,7 +6413,8 @@
           <a:p>
             <a:fld id="{2C1AB886-C58C-E04A-A1A5-89119FBFA308}" type="datetimeFigureOut">
               <a:rPr lang="en-US" smtClean="0"/>
-              <a:t>7/1/2014</a:t>
+              <a:pPr/>
+              <a:t>7/28/2014</a:t>
             </a:fld>
             <a:endParaRPr lang="en-US"/>
           </a:p>
@@ -6924,6 +6456,7 @@
           <a:p>
             <a:fld id="{E63D5F4D-67BA-2043-B4FA-2B1A402302C1}" type="slidenum">
               <a:rPr lang="en-US" smtClean="0"/>
+              <a:pPr/>
               <a:t>‹#›</a:t>
             </a:fld>
             <a:endParaRPr lang="en-US"/>
@@ -6933,7 +6466,7 @@
     </p:spTree>
     <p:extLst>
       <p:ext uri="{BB962C8B-B14F-4D97-AF65-F5344CB8AC3E}">
-        <p14:creationId xmlns:p14="http://schemas.microsoft.com/office/powerpoint/2010/main" val="2557581024"/>
+        <p14:creationId xmlns:p14="http://schemas.microsoft.com/office/powerpoint/2010/main" xmlns="" val="2557581024"/>
       </p:ext>
     </p:extLst>
   </p:cSld>
@@ -7135,7 +6668,8 @@
           <a:p>
             <a:fld id="{2C1AB886-C58C-E04A-A1A5-89119FBFA308}" type="datetimeFigureOut">
               <a:rPr lang="en-US" smtClean="0"/>
-              <a:t>7/1/2014</a:t>
+              <a:pPr/>
+              <a:t>7/28/2014</a:t>
             </a:fld>
             <a:endParaRPr lang="en-US"/>
           </a:p>
@@ -7177,6 +6711,7 @@
           <a:p>
             <a:fld id="{E63D5F4D-67BA-2043-B4FA-2B1A402302C1}" type="slidenum">
               <a:rPr lang="en-US" smtClean="0"/>
+              <a:pPr/>
               <a:t>‹#›</a:t>
             </a:fld>
             <a:endParaRPr lang="en-US"/>
@@ -7186,7 +6721,7 @@
     </p:spTree>
     <p:extLst>
       <p:ext uri="{BB962C8B-B14F-4D97-AF65-F5344CB8AC3E}">
-        <p14:creationId xmlns:p14="http://schemas.microsoft.com/office/powerpoint/2010/main" val="3782472849"/>
+        <p14:creationId xmlns:p14="http://schemas.microsoft.com/office/powerpoint/2010/main" xmlns="" val="3782472849"/>
       </p:ext>
     </p:extLst>
   </p:cSld>
@@ -7348,7 +6883,8 @@
           <a:p>
             <a:fld id="{2C1AB886-C58C-E04A-A1A5-89119FBFA308}" type="datetimeFigureOut">
               <a:rPr lang="en-US" smtClean="0"/>
-              <a:t>7/1/2014</a:t>
+              <a:pPr/>
+              <a:t>7/28/2014</a:t>
             </a:fld>
             <a:endParaRPr lang="en-US"/>
           </a:p>
@@ -7430,6 +6966,7 @@
           <a:p>
             <a:fld id="{E63D5F4D-67BA-2043-B4FA-2B1A402302C1}" type="slidenum">
               <a:rPr lang="en-US" smtClean="0"/>
+              <a:pPr/>
               <a:t>‹#›</a:t>
             </a:fld>
             <a:endParaRPr lang="en-US"/>
@@ -7439,7 +6976,7 @@
     </p:spTree>
     <p:extLst>
       <p:ext uri="{BB962C8B-B14F-4D97-AF65-F5344CB8AC3E}">
-        <p14:creationId xmlns:p14="http://schemas.microsoft.com/office/powerpoint/2010/main" val="3389652969"/>
+        <p14:creationId xmlns:p14="http://schemas.microsoft.com/office/powerpoint/2010/main" xmlns="" val="3389652969"/>
       </p:ext>
     </p:extLst>
   </p:cSld>
@@ -7776,7 +7313,7 @@
           <p:nvPr>
             <p:extLst>
               <p:ext uri="{D42A27DB-BD31-4B8C-83A1-F6EECF244321}">
-                <p14:modId xmlns:p14="http://schemas.microsoft.com/office/powerpoint/2010/main" val="3576573229"/>
+                <p14:modId xmlns:p14="http://schemas.microsoft.com/office/powerpoint/2010/main" xmlns="" val="3576573229"/>
               </p:ext>
             </p:extLst>
           </p:nvPr>
@@ -7814,10 +7351,10 @@
             <p:nvPr/>
           </p:nvPicPr>
           <p:blipFill>
-            <a:blip r:embed="rId7">
+            <a:blip r:embed="rId6">
               <a:extLst>
                 <a:ext uri="{28A0092B-C50C-407E-A947-70E740481C1C}">
-                  <a14:useLocalDpi xmlns:a14="http://schemas.microsoft.com/office/drawing/2010/main" val="0"/>
+                  <a14:useLocalDpi xmlns:a14="http://schemas.microsoft.com/office/drawing/2010/main" xmlns="" val="0"/>
                 </a:ext>
               </a:extLst>
             </a:blip>
@@ -7837,7 +7374,7 @@
             <a:noFill/>
             <a:extLst>
               <a:ext uri="{909E8E84-426E-40DD-AFC4-6F175D3DCCD1}">
-                <a14:hiddenFill xmlns:a14="http://schemas.microsoft.com/office/drawing/2010/main">
+                <a14:hiddenFill xmlns:a14="http://schemas.microsoft.com/office/drawing/2010/main" xmlns="">
                   <a:solidFill>
                     <a:srgbClr val="FFFFFF"/>
                   </a:solidFill>
@@ -8031,10 +7568,10 @@
             <p:nvPr/>
           </p:nvPicPr>
           <p:blipFill>
-            <a:blip r:embed="rId8">
+            <a:blip r:embed="rId7">
               <a:extLst>
                 <a:ext uri="{28A0092B-C50C-407E-A947-70E740481C1C}">
-                  <a14:useLocalDpi xmlns:a14="http://schemas.microsoft.com/office/drawing/2010/main" val="0"/>
+                  <a14:useLocalDpi xmlns:a14="http://schemas.microsoft.com/office/drawing/2010/main" xmlns="" val="0"/>
                 </a:ext>
               </a:extLst>
             </a:blip>
@@ -8054,7 +7591,7 @@
             <a:noFill/>
             <a:extLst>
               <a:ext uri="{909E8E84-426E-40DD-AFC4-6F175D3DCCD1}">
-                <a14:hiddenFill xmlns:a14="http://schemas.microsoft.com/office/drawing/2010/main">
+                <a14:hiddenFill xmlns:a14="http://schemas.microsoft.com/office/drawing/2010/main" xmlns="">
                   <a:solidFill>
                     <a:srgbClr val="FFFFFF"/>
                   </a:solidFill>
@@ -8323,10 +7860,10 @@
               <p:nvPr/>
             </p:nvPicPr>
             <p:blipFill>
-              <a:blip r:embed="rId9">
+              <a:blip r:embed="rId8">
                 <a:extLst>
                   <a:ext uri="{28A0092B-C50C-407E-A947-70E740481C1C}">
-                    <a14:useLocalDpi xmlns:a14="http://schemas.microsoft.com/office/drawing/2010/main" val="0"/>
+                    <a14:useLocalDpi xmlns:a14="http://schemas.microsoft.com/office/drawing/2010/main" xmlns="" val="0"/>
                   </a:ext>
                 </a:extLst>
               </a:blip>
@@ -8337,7 +7874,7 @@
             </p:blipFill>
             <p:spPr bwMode="auto">
               <a:xfrm>
-                <a:off x="7233946" y="3868846"/>
+                <a:off x="7148278" y="3854682"/>
                 <a:ext cx="659481" cy="566944"/>
               </a:xfrm>
               <a:prstGeom prst="rect">
@@ -8346,7 +7883,7 @@
               <a:noFill/>
               <a:extLst>
                 <a:ext uri="{909E8E84-426E-40DD-AFC4-6F175D3DCCD1}">
-                  <a14:hiddenFill xmlns:a14="http://schemas.microsoft.com/office/drawing/2010/main">
+                  <a14:hiddenFill xmlns:a14="http://schemas.microsoft.com/office/drawing/2010/main" xmlns="">
                     <a:solidFill>
                       <a:srgbClr val="FFFFFF"/>
                     </a:solidFill>
@@ -8394,10 +7931,10 @@
               <p:nvPr/>
             </p:nvPicPr>
             <p:blipFill>
-              <a:blip r:embed="rId10">
+              <a:blip r:embed="rId9">
                 <a:extLst>
                   <a:ext uri="{28A0092B-C50C-407E-A947-70E740481C1C}">
-                    <a14:useLocalDpi xmlns:a14="http://schemas.microsoft.com/office/drawing/2010/main" val="0"/>
+                    <a14:useLocalDpi xmlns:a14="http://schemas.microsoft.com/office/drawing/2010/main" xmlns="" val="0"/>
                   </a:ext>
                 </a:extLst>
               </a:blip>
@@ -8417,7 +7954,7 @@
               <a:noFill/>
               <a:extLst>
                 <a:ext uri="{909E8E84-426E-40DD-AFC4-6F175D3DCCD1}">
-                  <a14:hiddenFill xmlns:a14="http://schemas.microsoft.com/office/drawing/2010/main">
+                  <a14:hiddenFill xmlns:a14="http://schemas.microsoft.com/office/drawing/2010/main" xmlns="">
                     <a:solidFill>
                       <a:srgbClr val="FFFFFF"/>
                     </a:solidFill>
@@ -8465,10 +8002,10 @@
               <p:nvPr/>
             </p:nvPicPr>
             <p:blipFill>
-              <a:blip r:embed="rId11">
+              <a:blip r:embed="rId10">
                 <a:extLst>
                   <a:ext uri="{28A0092B-C50C-407E-A947-70E740481C1C}">
-                    <a14:useLocalDpi xmlns:a14="http://schemas.microsoft.com/office/drawing/2010/main" val="0"/>
+                    <a14:useLocalDpi xmlns:a14="http://schemas.microsoft.com/office/drawing/2010/main" xmlns="" val="0"/>
                   </a:ext>
                 </a:extLst>
               </a:blip>
@@ -8488,7 +8025,7 @@
               <a:noFill/>
               <a:extLst>
                 <a:ext uri="{909E8E84-426E-40DD-AFC4-6F175D3DCCD1}">
-                  <a14:hiddenFill xmlns:a14="http://schemas.microsoft.com/office/drawing/2010/main">
+                  <a14:hiddenFill xmlns:a14="http://schemas.microsoft.com/office/drawing/2010/main" xmlns="">
                     <a:solidFill>
                       <a:srgbClr val="FFFFFF"/>
                     </a:solidFill>
@@ -8536,10 +8073,10 @@
               <p:nvPr/>
             </p:nvPicPr>
             <p:blipFill>
-              <a:blip r:embed="rId12">
+              <a:blip r:embed="rId11">
                 <a:extLst>
                   <a:ext uri="{28A0092B-C50C-407E-A947-70E740481C1C}">
-                    <a14:useLocalDpi xmlns:a14="http://schemas.microsoft.com/office/drawing/2010/main" val="0"/>
+                    <a14:useLocalDpi xmlns:a14="http://schemas.microsoft.com/office/drawing/2010/main" xmlns="" val="0"/>
                   </a:ext>
                 </a:extLst>
               </a:blip>
@@ -8559,7 +8096,7 @@
               <a:noFill/>
               <a:extLst>
                 <a:ext uri="{909E8E84-426E-40DD-AFC4-6F175D3DCCD1}">
-                  <a14:hiddenFill xmlns:a14="http://schemas.microsoft.com/office/drawing/2010/main">
+                  <a14:hiddenFill xmlns:a14="http://schemas.microsoft.com/office/drawing/2010/main" xmlns="">
                     <a:solidFill>
                       <a:srgbClr val="FFFFFF"/>
                     </a:solidFill>
@@ -8615,10 +8152,10 @@
               <p:nvPr/>
             </p:nvPicPr>
             <p:blipFill>
-              <a:blip r:embed="rId13">
+              <a:blip r:embed="rId12">
                 <a:extLst>
                   <a:ext uri="{28A0092B-C50C-407E-A947-70E740481C1C}">
-                    <a14:useLocalDpi xmlns:a14="http://schemas.microsoft.com/office/drawing/2010/main" val="0"/>
+                    <a14:useLocalDpi xmlns:a14="http://schemas.microsoft.com/office/drawing/2010/main" xmlns="" val="0"/>
                   </a:ext>
                 </a:extLst>
               </a:blip>
@@ -8638,7 +8175,7 @@
               <a:noFill/>
               <a:extLst>
                 <a:ext uri="{909E8E84-426E-40DD-AFC4-6F175D3DCCD1}">
-                  <a14:hiddenFill xmlns:a14="http://schemas.microsoft.com/office/drawing/2010/main">
+                  <a14:hiddenFill xmlns:a14="http://schemas.microsoft.com/office/drawing/2010/main" xmlns="">
                     <a:solidFill>
                       <a:srgbClr val="FFFFFF"/>
                     </a:solidFill>
@@ -8816,7 +8353,7 @@
     </p:spTree>
     <p:extLst>
       <p:ext uri="{BB962C8B-B14F-4D97-AF65-F5344CB8AC3E}">
-        <p14:creationId xmlns:p14="http://schemas.microsoft.com/office/powerpoint/2010/main" val="1375270783"/>
+        <p14:creationId xmlns:p14="http://schemas.microsoft.com/office/powerpoint/2010/main" xmlns="" val="1375270783"/>
       </p:ext>
     </p:extLst>
   </p:cSld>
@@ -9044,7 +8581,7 @@
           <a:blip r:embed="rId2">
             <a:extLst>
               <a:ext uri="{28A0092B-C50C-407E-A947-70E740481C1C}">
-                <a14:useLocalDpi xmlns:a14="http://schemas.microsoft.com/office/drawing/2010/main" val="0"/>
+                <a14:useLocalDpi xmlns:a14="http://schemas.microsoft.com/office/drawing/2010/main" xmlns="" val="0"/>
               </a:ext>
             </a:extLst>
           </a:blip>
@@ -9068,14 +8605,14 @@
           <a:effectLst/>
           <a:extLst>
             <a:ext uri="{909E8E84-426E-40DD-AFC4-6F175D3DCCD1}">
-              <a14:hiddenFill xmlns:a14="http://schemas.microsoft.com/office/drawing/2010/main">
+              <a14:hiddenFill xmlns:a14="http://schemas.microsoft.com/office/drawing/2010/main" xmlns="">
                 <a:solidFill>
                   <a:schemeClr val="accent1"/>
                 </a:solidFill>
               </a14:hiddenFill>
             </a:ext>
             <a:ext uri="{91240B29-F687-4F45-9708-019B960494DF}">
-              <a14:hiddenLine xmlns:a14="http://schemas.microsoft.com/office/drawing/2010/main" w="9525">
+              <a14:hiddenLine xmlns:a14="http://schemas.microsoft.com/office/drawing/2010/main" xmlns="" w="9525">
                 <a:solidFill>
                   <a:schemeClr val="tx1"/>
                 </a:solidFill>
@@ -9085,7 +8622,7 @@
               </a14:hiddenLine>
             </a:ext>
             <a:ext uri="{AF507438-7753-43E0-B8FC-AC1667EBCBE1}">
-              <a14:hiddenEffects xmlns:a14="http://schemas.microsoft.com/office/drawing/2010/main">
+              <a14:hiddenEffects xmlns:a14="http://schemas.microsoft.com/office/drawing/2010/main" xmlns="">
                 <a:effectLst>
                   <a:outerShdw dist="35921" dir="2700000" algn="ctr" rotWithShape="0">
                     <a:schemeClr val="bg2"/>
@@ -9471,7 +9008,7 @@
     </p:spTree>
     <p:extLst>
       <p:ext uri="{BB962C8B-B14F-4D97-AF65-F5344CB8AC3E}">
-        <p14:creationId xmlns:p14="http://schemas.microsoft.com/office/powerpoint/2010/main" val="3763827867"/>
+        <p14:creationId xmlns:p14="http://schemas.microsoft.com/office/powerpoint/2010/main" xmlns="" val="3763827867"/>
       </p:ext>
     </p:extLst>
   </p:cSld>
@@ -9517,7 +9054,7 @@
           <a:blip r:embed="rId2">
             <a:extLst>
               <a:ext uri="{28A0092B-C50C-407E-A947-70E740481C1C}">
-                <a14:useLocalDpi xmlns:a14="http://schemas.microsoft.com/office/drawing/2010/main" val="0"/>
+                <a14:useLocalDpi xmlns:a14="http://schemas.microsoft.com/office/drawing/2010/main" xmlns="" val="0"/>
               </a:ext>
             </a:extLst>
           </a:blip>
@@ -9547,7 +9084,7 @@
           <a:blip r:embed="rId3">
             <a:extLst>
               <a:ext uri="{28A0092B-C50C-407E-A947-70E740481C1C}">
-                <a14:useLocalDpi xmlns:a14="http://schemas.microsoft.com/office/drawing/2010/main" val="0"/>
+                <a14:useLocalDpi xmlns:a14="http://schemas.microsoft.com/office/drawing/2010/main" xmlns="" val="0"/>
               </a:ext>
             </a:extLst>
           </a:blip>
@@ -9567,7 +9104,7 @@
           <a:noFill/>
           <a:extLst>
             <a:ext uri="{909E8E84-426E-40DD-AFC4-6F175D3DCCD1}">
-              <a14:hiddenFill xmlns:a14="http://schemas.microsoft.com/office/drawing/2010/main">
+              <a14:hiddenFill xmlns:a14="http://schemas.microsoft.com/office/drawing/2010/main" xmlns="">
                 <a:solidFill>
                   <a:srgbClr val="FFFFFF"/>
                 </a:solidFill>
@@ -9602,7 +9139,7 @@
             <a:blip r:embed="rId4">
               <a:extLst>
                 <a:ext uri="{28A0092B-C50C-407E-A947-70E740481C1C}">
-                  <a14:useLocalDpi xmlns:a14="http://schemas.microsoft.com/office/drawing/2010/main" val="0"/>
+                  <a14:useLocalDpi xmlns:a14="http://schemas.microsoft.com/office/drawing/2010/main" xmlns="" val="0"/>
                 </a:ext>
               </a:extLst>
             </a:blip>
@@ -9871,7 +9408,7 @@
             <a:blip r:embed="rId6">
               <a:extLst>
                 <a:ext uri="{28A0092B-C50C-407E-A947-70E740481C1C}">
-                  <a14:useLocalDpi xmlns:a14="http://schemas.microsoft.com/office/drawing/2010/main" val="0"/>
+                  <a14:useLocalDpi xmlns:a14="http://schemas.microsoft.com/office/drawing/2010/main" xmlns="" val="0"/>
                 </a:ext>
               </a:extLst>
             </a:blip>
@@ -9895,14 +9432,14 @@
             <a:effectLst/>
             <a:extLst>
               <a:ext uri="{909E8E84-426E-40DD-AFC4-6F175D3DCCD1}">
-                <a14:hiddenFill xmlns:a14="http://schemas.microsoft.com/office/drawing/2010/main">
+                <a14:hiddenFill xmlns:a14="http://schemas.microsoft.com/office/drawing/2010/main" xmlns="">
                   <a:solidFill>
                     <a:schemeClr val="accent1"/>
                   </a:solidFill>
                 </a14:hiddenFill>
               </a:ext>
               <a:ext uri="{91240B29-F687-4F45-9708-019B960494DF}">
-                <a14:hiddenLine xmlns:a14="http://schemas.microsoft.com/office/drawing/2010/main" w="9525">
+                <a14:hiddenLine xmlns:a14="http://schemas.microsoft.com/office/drawing/2010/main" xmlns="" w="9525">
                   <a:solidFill>
                     <a:schemeClr val="tx1"/>
                   </a:solidFill>
@@ -9912,7 +9449,7 @@
                 </a14:hiddenLine>
               </a:ext>
               <a:ext uri="{AF507438-7753-43E0-B8FC-AC1667EBCBE1}">
-                <a14:hiddenEffects xmlns:a14="http://schemas.microsoft.com/office/drawing/2010/main">
+                <a14:hiddenEffects xmlns:a14="http://schemas.microsoft.com/office/drawing/2010/main" xmlns="">
                   <a:effectLst>
                     <a:outerShdw dist="35921" dir="2700000" algn="ctr" rotWithShape="0">
                       <a:schemeClr val="bg2"/>
@@ -10064,7 +9601,7 @@
     </p:spTree>
     <p:extLst>
       <p:ext uri="{BB962C8B-B14F-4D97-AF65-F5344CB8AC3E}">
-        <p14:creationId xmlns:p14="http://schemas.microsoft.com/office/powerpoint/2010/main" val="647710703"/>
+        <p14:creationId xmlns:p14="http://schemas.microsoft.com/office/powerpoint/2010/main" xmlns="" val="647710703"/>
       </p:ext>
     </p:extLst>
   </p:cSld>
@@ -10364,7 +9901,7 @@
             <a:blip r:embed="rId3">
               <a:extLst>
                 <a:ext uri="{28A0092B-C50C-407E-A947-70E740481C1C}">
-                  <a14:useLocalDpi xmlns:a14="http://schemas.microsoft.com/office/drawing/2010/main" val="0"/>
+                  <a14:useLocalDpi xmlns:a14="http://schemas.microsoft.com/office/drawing/2010/main" xmlns="" val="0"/>
                 </a:ext>
               </a:extLst>
             </a:blip>
@@ -11213,7 +10750,7 @@
               <a:blip r:embed="rId6">
                 <a:extLst>
                   <a:ext uri="{28A0092B-C50C-407E-A947-70E740481C1C}">
-                    <a14:useLocalDpi xmlns:a14="http://schemas.microsoft.com/office/drawing/2010/main" val="0"/>
+                    <a14:useLocalDpi xmlns:a14="http://schemas.microsoft.com/office/drawing/2010/main" xmlns="" val="0"/>
                   </a:ext>
                 </a:extLst>
               </a:blip>
@@ -11243,7 +10780,7 @@
               <a:blip r:embed="rId7">
                 <a:extLst>
                   <a:ext uri="{28A0092B-C50C-407E-A947-70E740481C1C}">
-                    <a14:useLocalDpi xmlns:a14="http://schemas.microsoft.com/office/drawing/2010/main" val="0"/>
+                    <a14:useLocalDpi xmlns:a14="http://schemas.microsoft.com/office/drawing/2010/main" xmlns="" val="0"/>
                   </a:ext>
                 </a:extLst>
               </a:blip>
@@ -11273,7 +10810,7 @@
               <a:blip r:embed="rId8">
                 <a:extLst>
                   <a:ext uri="{28A0092B-C50C-407E-A947-70E740481C1C}">
-                    <a14:useLocalDpi xmlns:a14="http://schemas.microsoft.com/office/drawing/2010/main" val="0"/>
+                    <a14:useLocalDpi xmlns:a14="http://schemas.microsoft.com/office/drawing/2010/main" xmlns="" val="0"/>
                   </a:ext>
                 </a:extLst>
               </a:blip>
@@ -11485,7 +11022,7 @@
     </p:spTree>
     <p:extLst>
       <p:ext uri="{BB962C8B-B14F-4D97-AF65-F5344CB8AC3E}">
-        <p14:creationId xmlns:p14="http://schemas.microsoft.com/office/powerpoint/2010/main" val="3846612809"/>
+        <p14:creationId xmlns:p14="http://schemas.microsoft.com/office/powerpoint/2010/main" xmlns="" val="3846612809"/>
       </p:ext>
     </p:extLst>
   </p:cSld>
@@ -11716,7 +11253,7 @@
           <a:blip r:embed="rId3">
             <a:extLst>
               <a:ext uri="{28A0092B-C50C-407E-A947-70E740481C1C}">
-                <a14:useLocalDpi xmlns:a14="http://schemas.microsoft.com/office/drawing/2010/main" val="0"/>
+                <a14:useLocalDpi xmlns:a14="http://schemas.microsoft.com/office/drawing/2010/main" xmlns="" val="0"/>
               </a:ext>
             </a:extLst>
           </a:blip>
@@ -11744,7 +11281,7 @@
           </a:ln>
           <a:extLst>
             <a:ext uri="{909E8E84-426E-40DD-AFC4-6F175D3DCCD1}">
-              <a14:hiddenFill xmlns:a14="http://schemas.microsoft.com/office/drawing/2010/main">
+              <a14:hiddenFill xmlns:a14="http://schemas.microsoft.com/office/drawing/2010/main" xmlns="">
                 <a:solidFill>
                   <a:srgbClr val="FFFFFF"/>
                 </a:solidFill>
@@ -11765,7 +11302,7 @@
           <a:blip r:embed="rId4">
             <a:extLst>
               <a:ext uri="{28A0092B-C50C-407E-A947-70E740481C1C}">
-                <a14:useLocalDpi xmlns:a14="http://schemas.microsoft.com/office/drawing/2010/main" val="0"/>
+                <a14:useLocalDpi xmlns:a14="http://schemas.microsoft.com/office/drawing/2010/main" xmlns="" val="0"/>
               </a:ext>
             </a:extLst>
           </a:blip>
@@ -11793,7 +11330,7 @@
           </a:ln>
           <a:extLst>
             <a:ext uri="{909E8E84-426E-40DD-AFC4-6F175D3DCCD1}">
-              <a14:hiddenFill xmlns:a14="http://schemas.microsoft.com/office/drawing/2010/main">
+              <a14:hiddenFill xmlns:a14="http://schemas.microsoft.com/office/drawing/2010/main" xmlns="">
                 <a:solidFill>
                   <a:srgbClr val="FFFFFF"/>
                 </a:solidFill>
@@ -11996,7 +11533,7 @@
     </p:spTree>
     <p:extLst>
       <p:ext uri="{BB962C8B-B14F-4D97-AF65-F5344CB8AC3E}">
-        <p14:creationId xmlns:p14="http://schemas.microsoft.com/office/powerpoint/2010/main" val="820275443"/>
+        <p14:creationId xmlns:p14="http://schemas.microsoft.com/office/powerpoint/2010/main" xmlns="" val="820275443"/>
       </p:ext>
     </p:extLst>
   </p:cSld>
@@ -12081,7 +11618,7 @@
           <a:blip r:embed="rId3">
             <a:extLst>
               <a:ext uri="{28A0092B-C50C-407E-A947-70E740481C1C}">
-                <a14:useLocalDpi xmlns:a14="http://schemas.microsoft.com/office/drawing/2010/main" val="0"/>
+                <a14:useLocalDpi xmlns:a14="http://schemas.microsoft.com/office/drawing/2010/main" xmlns="" val="0"/>
               </a:ext>
             </a:extLst>
           </a:blip>
@@ -12105,14 +11642,14 @@
           <a:effectLst/>
           <a:extLst>
             <a:ext uri="{909E8E84-426E-40DD-AFC4-6F175D3DCCD1}">
-              <a14:hiddenFill xmlns:a14="http://schemas.microsoft.com/office/drawing/2010/main">
+              <a14:hiddenFill xmlns:a14="http://schemas.microsoft.com/office/drawing/2010/main" xmlns="">
                 <a:solidFill>
                   <a:schemeClr val="accent1"/>
                 </a:solidFill>
               </a14:hiddenFill>
             </a:ext>
             <a:ext uri="{91240B29-F687-4F45-9708-019B960494DF}">
-              <a14:hiddenLine xmlns:a14="http://schemas.microsoft.com/office/drawing/2010/main" w="9525">
+              <a14:hiddenLine xmlns:a14="http://schemas.microsoft.com/office/drawing/2010/main" xmlns="" w="9525">
                 <a:solidFill>
                   <a:schemeClr val="tx1"/>
                 </a:solidFill>
@@ -12122,7 +11659,7 @@
               </a14:hiddenLine>
             </a:ext>
             <a:ext uri="{AF507438-7753-43E0-B8FC-AC1667EBCBE1}">
-              <a14:hiddenEffects xmlns:a14="http://schemas.microsoft.com/office/drawing/2010/main">
+              <a14:hiddenEffects xmlns:a14="http://schemas.microsoft.com/office/drawing/2010/main" xmlns="">
                 <a:effectLst>
                   <a:outerShdw dist="35921" dir="2700000" algn="ctr" rotWithShape="0">
                     <a:schemeClr val="bg2"/>
@@ -12522,7 +12059,7 @@
     </p:spTree>
     <p:extLst>
       <p:ext uri="{BB962C8B-B14F-4D97-AF65-F5344CB8AC3E}">
-        <p14:creationId xmlns:p14="http://schemas.microsoft.com/office/powerpoint/2010/main" val="1285341173"/>
+        <p14:creationId xmlns:p14="http://schemas.microsoft.com/office/powerpoint/2010/main" xmlns="" val="1285341173"/>
       </p:ext>
     </p:extLst>
   </p:cSld>
@@ -12859,7 +12396,7 @@
           <a:blip r:embed="rId3">
             <a:extLst>
               <a:ext uri="{28A0092B-C50C-407E-A947-70E740481C1C}">
-                <a14:useLocalDpi xmlns:a14="http://schemas.microsoft.com/office/drawing/2010/main" val="0"/>
+                <a14:useLocalDpi xmlns:a14="http://schemas.microsoft.com/office/drawing/2010/main" xmlns="" val="0"/>
               </a:ext>
             </a:extLst>
           </a:blip>
@@ -13038,7 +12575,7 @@
           <a:blip r:embed="rId4">
             <a:extLst>
               <a:ext uri="{28A0092B-C50C-407E-A947-70E740481C1C}">
-                <a14:useLocalDpi xmlns:a14="http://schemas.microsoft.com/office/drawing/2010/main" val="0"/>
+                <a14:useLocalDpi xmlns:a14="http://schemas.microsoft.com/office/drawing/2010/main" xmlns="" val="0"/>
               </a:ext>
             </a:extLst>
           </a:blip>
@@ -13062,14 +12599,14 @@
           <a:effectLst/>
           <a:extLst>
             <a:ext uri="{909E8E84-426E-40DD-AFC4-6F175D3DCCD1}">
-              <a14:hiddenFill xmlns:a14="http://schemas.microsoft.com/office/drawing/2010/main">
+              <a14:hiddenFill xmlns:a14="http://schemas.microsoft.com/office/drawing/2010/main" xmlns="">
                 <a:solidFill>
                   <a:schemeClr val="accent1"/>
                 </a:solidFill>
               </a14:hiddenFill>
             </a:ext>
             <a:ext uri="{91240B29-F687-4F45-9708-019B960494DF}">
-              <a14:hiddenLine xmlns:a14="http://schemas.microsoft.com/office/drawing/2010/main" w="9525">
+              <a14:hiddenLine xmlns:a14="http://schemas.microsoft.com/office/drawing/2010/main" xmlns="" w="9525">
                 <a:solidFill>
                   <a:schemeClr val="tx1"/>
                 </a:solidFill>
@@ -13079,7 +12616,7 @@
               </a14:hiddenLine>
             </a:ext>
             <a:ext uri="{AF507438-7753-43E0-B8FC-AC1667EBCBE1}">
-              <a14:hiddenEffects xmlns:a14="http://schemas.microsoft.com/office/drawing/2010/main">
+              <a14:hiddenEffects xmlns:a14="http://schemas.microsoft.com/office/drawing/2010/main" xmlns="">
                 <a:effectLst>
                   <a:outerShdw dist="35921" dir="2700000" algn="ctr" rotWithShape="0">
                     <a:schemeClr val="bg2"/>
@@ -13346,7 +12883,7 @@
           <a:blip r:embed="rId5">
             <a:extLst>
               <a:ext uri="{28A0092B-C50C-407E-A947-70E740481C1C}">
-                <a14:useLocalDpi xmlns:a14="http://schemas.microsoft.com/office/drawing/2010/main" val="0"/>
+                <a14:useLocalDpi xmlns:a14="http://schemas.microsoft.com/office/drawing/2010/main" xmlns="" val="0"/>
               </a:ext>
             </a:extLst>
           </a:blip>
@@ -13370,14 +12907,14 @@
           <a:effectLst/>
           <a:extLst>
             <a:ext uri="{909E8E84-426E-40DD-AFC4-6F175D3DCCD1}">
-              <a14:hiddenFill xmlns:a14="http://schemas.microsoft.com/office/drawing/2010/main">
+              <a14:hiddenFill xmlns:a14="http://schemas.microsoft.com/office/drawing/2010/main" xmlns="">
                 <a:solidFill>
                   <a:schemeClr val="accent1"/>
                 </a:solidFill>
               </a14:hiddenFill>
             </a:ext>
             <a:ext uri="{91240B29-F687-4F45-9708-019B960494DF}">
-              <a14:hiddenLine xmlns:a14="http://schemas.microsoft.com/office/drawing/2010/main" w="9525">
+              <a14:hiddenLine xmlns:a14="http://schemas.microsoft.com/office/drawing/2010/main" xmlns="" w="9525">
                 <a:solidFill>
                   <a:schemeClr val="tx1"/>
                 </a:solidFill>
@@ -13387,7 +12924,7 @@
               </a14:hiddenLine>
             </a:ext>
             <a:ext uri="{AF507438-7753-43E0-B8FC-AC1667EBCBE1}">
-              <a14:hiddenEffects xmlns:a14="http://schemas.microsoft.com/office/drawing/2010/main">
+              <a14:hiddenEffects xmlns:a14="http://schemas.microsoft.com/office/drawing/2010/main" xmlns="">
                 <a:effectLst>
                   <a:outerShdw dist="35921" dir="2700000" algn="ctr" rotWithShape="0">
                     <a:schemeClr val="bg2"/>
@@ -13443,7 +12980,7 @@
           <a:blip r:embed="rId5">
             <a:extLst>
               <a:ext uri="{28A0092B-C50C-407E-A947-70E740481C1C}">
-                <a14:useLocalDpi xmlns:a14="http://schemas.microsoft.com/office/drawing/2010/main" val="0"/>
+                <a14:useLocalDpi xmlns:a14="http://schemas.microsoft.com/office/drawing/2010/main" xmlns="" val="0"/>
               </a:ext>
             </a:extLst>
           </a:blip>
@@ -13467,14 +13004,14 @@
           <a:effectLst/>
           <a:extLst>
             <a:ext uri="{909E8E84-426E-40DD-AFC4-6F175D3DCCD1}">
-              <a14:hiddenFill xmlns:a14="http://schemas.microsoft.com/office/drawing/2010/main">
+              <a14:hiddenFill xmlns:a14="http://schemas.microsoft.com/office/drawing/2010/main" xmlns="">
                 <a:solidFill>
                   <a:schemeClr val="accent1"/>
                 </a:solidFill>
               </a14:hiddenFill>
             </a:ext>
             <a:ext uri="{91240B29-F687-4F45-9708-019B960494DF}">
-              <a14:hiddenLine xmlns:a14="http://schemas.microsoft.com/office/drawing/2010/main" w="9525">
+              <a14:hiddenLine xmlns:a14="http://schemas.microsoft.com/office/drawing/2010/main" xmlns="" w="9525">
                 <a:solidFill>
                   <a:schemeClr val="tx1"/>
                 </a:solidFill>
@@ -13484,7 +13021,7 @@
               </a14:hiddenLine>
             </a:ext>
             <a:ext uri="{AF507438-7753-43E0-B8FC-AC1667EBCBE1}">
-              <a14:hiddenEffects xmlns:a14="http://schemas.microsoft.com/office/drawing/2010/main">
+              <a14:hiddenEffects xmlns:a14="http://schemas.microsoft.com/office/drawing/2010/main" xmlns="">
                 <a:effectLst>
                   <a:outerShdw dist="35921" dir="2700000" algn="ctr" rotWithShape="0">
                     <a:schemeClr val="bg2"/>
@@ -13531,7 +13068,7 @@
     </p:spTree>
     <p:extLst>
       <p:ext uri="{BB962C8B-B14F-4D97-AF65-F5344CB8AC3E}">
-        <p14:creationId xmlns:p14="http://schemas.microsoft.com/office/powerpoint/2010/main" val="1113904522"/>
+        <p14:creationId xmlns:p14="http://schemas.microsoft.com/office/powerpoint/2010/main" xmlns="" val="1113904522"/>
       </p:ext>
     </p:extLst>
   </p:cSld>

</xml_diff>